<commit_message>
Final powerpoint slide for capstone presentation
</commit_message>
<xml_diff>
--- a/CapstonePresentation.pptx
+++ b/CapstonePresentation.pptx
@@ -4201,11 +4201,10 @@
             </a:r>
           </a:p>
           <a:p>
-            <a:pPr lvl="1"/>
-            <a:r>
-              <a:rPr lang="en-US" dirty="0"/>
-              <a:t>Decay = .01</a:t>
-            </a:r>
+            <a:pPr marL="457200" lvl="1" indent="0">
+              <a:buNone/>
+            </a:pPr>
+            <a:endParaRPr lang="en-US" dirty="0"/>
           </a:p>
           <a:p>
             <a:pPr marL="0" indent="0">
@@ -4345,11 +4344,10 @@
             </a:r>
           </a:p>
           <a:p>
-            <a:pPr lvl="1"/>
-            <a:r>
-              <a:rPr lang="en-US" dirty="0"/>
-              <a:t>Decay = .001</a:t>
-            </a:r>
+            <a:pPr marL="457200" lvl="1" indent="0">
+              <a:buNone/>
+            </a:pPr>
+            <a:endParaRPr lang="en-US" dirty="0"/>
           </a:p>
           <a:p>
             <a:pPr marL="0" indent="0">

</xml_diff>